<commit_message>
Fixed graphic on PPT slides
</commit_message>
<xml_diff>
--- a/AAPT_2018-Winter/PICUP Talk - AAPT Winter 2018-Final.pptx
+++ b/AAPT_2018-Winter/PICUP Talk - AAPT Winter 2018-Final.pptx
@@ -2,13 +2,13 @@
 <file path=ppt/presentation.xml><?xml version="1.0" encoding="utf-8"?>
 <p:presentation xmlns:a="http://schemas.openxmlformats.org/drawingml/2006/main" xmlns:r="http://schemas.openxmlformats.org/officeDocument/2006/relationships" xmlns:p="http://schemas.openxmlformats.org/presentationml/2006/main" saveSubsetFonts="1">
   <p:sldMasterIdLst>
-    <p:sldMasterId id="2147483744" r:id="rId1"/>
+    <p:sldMasterId id="2147483756" r:id="rId1"/>
   </p:sldMasterIdLst>
   <p:notesMasterIdLst>
     <p:notesMasterId r:id="rId11"/>
   </p:notesMasterIdLst>
   <p:sldIdLst>
-    <p:sldId id="258" r:id="rId2"/>
+    <p:sldId id="288" r:id="rId2"/>
     <p:sldId id="279" r:id="rId3"/>
     <p:sldId id="280" r:id="rId4"/>
     <p:sldId id="281" r:id="rId5"/>
@@ -216,7 +216,7 @@
           <a:p>
             <a:fld id="{9931A059-B47F-4FE1-9BF5-7848CDE73DB0}" type="datetimeFigureOut">
               <a:rPr lang="en-US" smtClean="0"/>
-              <a:t>1/5/18</a:t>
+              <a:t>1/8/18</a:t>
             </a:fld>
             <a:endParaRPr lang="en-US"/>
           </a:p>
@@ -633,6 +633,11 @@
         </p:txBody>
       </p:sp>
     </p:spTree>
+    <p:extLst>
+      <p:ext uri="{BB962C8B-B14F-4D97-AF65-F5344CB8AC3E}">
+        <p14:creationId xmlns:p14="http://schemas.microsoft.com/office/powerpoint/2010/main" val="176536090"/>
+      </p:ext>
+    </p:extLst>
   </p:cSld>
   <p:clrMapOvr>
     <a:masterClrMapping/>
@@ -1964,7 +1969,7 @@
           <a:p>
             <a:fld id="{4AA33690-DF3B-4993-B038-CC124D6A2A9E}" type="datetimeFigureOut">
               <a:rPr lang="en-US" smtClean="0"/>
-              <a:t>1/5/18</a:t>
+              <a:t>1/8/18</a:t>
             </a:fld>
             <a:endParaRPr lang="en-US"/>
           </a:p>
@@ -2160,7 +2165,7 @@
           <a:p>
             <a:fld id="{4AA33690-DF3B-4993-B038-CC124D6A2A9E}" type="datetimeFigureOut">
               <a:rPr lang="en-US" smtClean="0"/>
-              <a:t>1/5/18</a:t>
+              <a:t>1/8/18</a:t>
             </a:fld>
             <a:endParaRPr lang="en-US"/>
           </a:p>
@@ -2345,7 +2350,7 @@
           <a:p>
             <a:fld id="{4AA33690-DF3B-4993-B038-CC124D6A2A9E}" type="datetimeFigureOut">
               <a:rPr lang="en-US" smtClean="0"/>
-              <a:t>1/5/18</a:t>
+              <a:t>1/8/18</a:t>
             </a:fld>
             <a:endParaRPr lang="en-US"/>
           </a:p>
@@ -2441,35 +2446,35 @@
           <a:p>
             <a:pPr lvl="0" eaLnBrk="1" latinLnBrk="0" hangingPunct="1"/>
             <a:r>
-              <a:rPr lang="en-US" dirty="0" smtClean="0"/>
+              <a:rPr lang="en-US" smtClean="0"/>
               <a:t>Click to edit Master text styles</a:t>
             </a:r>
           </a:p>
           <a:p>
             <a:pPr lvl="1" eaLnBrk="1" latinLnBrk="0" hangingPunct="1"/>
             <a:r>
-              <a:rPr lang="en-US" dirty="0" smtClean="0"/>
+              <a:rPr lang="en-US" smtClean="0"/>
               <a:t>Second level</a:t>
             </a:r>
           </a:p>
           <a:p>
             <a:pPr lvl="2" eaLnBrk="1" latinLnBrk="0" hangingPunct="1"/>
             <a:r>
-              <a:rPr lang="en-US" dirty="0" smtClean="0"/>
+              <a:rPr lang="en-US" smtClean="0"/>
               <a:t>Third level</a:t>
             </a:r>
           </a:p>
           <a:p>
             <a:pPr lvl="3" eaLnBrk="1" latinLnBrk="0" hangingPunct="1"/>
             <a:r>
-              <a:rPr lang="en-US" dirty="0" smtClean="0"/>
+              <a:rPr lang="en-US" smtClean="0"/>
               <a:t>Fourth level</a:t>
             </a:r>
           </a:p>
           <a:p>
             <a:pPr lvl="4" eaLnBrk="1" latinLnBrk="0" hangingPunct="1"/>
             <a:r>
-              <a:rPr lang="en-US" dirty="0" smtClean="0"/>
+              <a:rPr lang="en-US" smtClean="0"/>
               <a:t>Fifth level</a:t>
             </a:r>
             <a:endParaRPr kumimoji="0" lang="en-US" dirty="0"/>
@@ -2495,7 +2500,7 @@
           <a:p>
             <a:fld id="{4AA33690-DF3B-4993-B038-CC124D6A2A9E}" type="datetimeFigureOut">
               <a:rPr lang="en-US" smtClean="0"/>
-              <a:t>1/5/18</a:t>
+              <a:t>1/8/18</a:t>
             </a:fld>
             <a:endParaRPr lang="en-US"/>
           </a:p>
@@ -2750,7 +2755,7 @@
           <a:p>
             <a:fld id="{4AA33690-DF3B-4993-B038-CC124D6A2A9E}" type="datetimeFigureOut">
               <a:rPr lang="en-US" smtClean="0"/>
-              <a:t>1/5/18</a:t>
+              <a:t>1/8/18</a:t>
             </a:fld>
             <a:endParaRPr lang="en-US"/>
           </a:p>
@@ -3159,7 +3164,7 @@
           <a:p>
             <a:fld id="{4AA33690-DF3B-4993-B038-CC124D6A2A9E}" type="datetimeFigureOut">
               <a:rPr lang="en-US" smtClean="0"/>
-              <a:t>1/5/18</a:t>
+              <a:t>1/8/18</a:t>
             </a:fld>
             <a:endParaRPr lang="en-US"/>
           </a:p>
@@ -3605,7 +3610,7 @@
           <a:p>
             <a:fld id="{4AA33690-DF3B-4993-B038-CC124D6A2A9E}" type="datetimeFigureOut">
               <a:rPr lang="en-US" smtClean="0"/>
-              <a:t>1/5/18</a:t>
+              <a:t>1/8/18</a:t>
             </a:fld>
             <a:endParaRPr lang="en-US"/>
           </a:p>
@@ -3706,7 +3711,7 @@
           <a:p>
             <a:fld id="{4AA33690-DF3B-4993-B038-CC124D6A2A9E}" type="datetimeFigureOut">
               <a:rPr lang="en-US" smtClean="0"/>
-              <a:t>1/5/18</a:t>
+              <a:t>1/8/18</a:t>
             </a:fld>
             <a:endParaRPr lang="en-US"/>
           </a:p>
@@ -3827,7 +3832,7 @@
           <a:p>
             <a:fld id="{4AA33690-DF3B-4993-B038-CC124D6A2A9E}" type="datetimeFigureOut">
               <a:rPr lang="en-US" smtClean="0"/>
-              <a:t>1/5/18</a:t>
+              <a:t>1/8/18</a:t>
             </a:fld>
             <a:endParaRPr lang="en-US"/>
           </a:p>
@@ -4101,7 +4106,7 @@
           <a:p>
             <a:fld id="{4AA33690-DF3B-4993-B038-CC124D6A2A9E}" type="datetimeFigureOut">
               <a:rPr lang="en-US" smtClean="0"/>
-              <a:t>1/5/18</a:t>
+              <a:t>1/8/18</a:t>
             </a:fld>
             <a:endParaRPr lang="en-US"/>
           </a:p>
@@ -4274,7 +4279,7 @@
           <a:p>
             <a:r>
               <a:rPr kumimoji="0" lang="en-US" smtClean="0"/>
-              <a:t>Click icon to add picture</a:t>
+              <a:t>Drag picture to placeholder or click icon to add</a:t>
             </a:r>
             <a:endParaRPr kumimoji="0" lang="en-US" dirty="0"/>
           </a:p>
@@ -4306,7 +4311,7 @@
           <a:p>
             <a:fld id="{4AA33690-DF3B-4993-B038-CC124D6A2A9E}" type="datetimeFigureOut">
               <a:rPr lang="en-US" smtClean="0"/>
-              <a:t>1/5/18</a:t>
+              <a:t>1/8/18</a:t>
             </a:fld>
             <a:endParaRPr lang="en-US"/>
           </a:p>
@@ -5415,7 +5420,7 @@
           <a:p>
             <a:fld id="{4AA33690-DF3B-4993-B038-CC124D6A2A9E}" type="datetimeFigureOut">
               <a:rPr lang="en-US" smtClean="0"/>
-              <a:t>1/5/18</a:t>
+              <a:t>1/8/18</a:t>
             </a:fld>
             <a:endParaRPr lang="en-US"/>
           </a:p>
@@ -5498,20 +5503,25 @@
         </p:txBody>
       </p:sp>
     </p:spTree>
+    <p:extLst>
+      <p:ext uri="{BB962C8B-B14F-4D97-AF65-F5344CB8AC3E}">
+        <p14:creationId xmlns:p14="http://schemas.microsoft.com/office/powerpoint/2010/main" val="294115884"/>
+      </p:ext>
+    </p:extLst>
   </p:cSld>
   <p:clrMap bg1="lt1" tx1="dk1" bg2="lt2" tx2="dk2" accent1="accent1" accent2="accent2" accent3="accent3" accent4="accent4" accent5="accent5" accent6="accent6" hlink="hlink" folHlink="folHlink"/>
   <p:sldLayoutIdLst>
-    <p:sldLayoutId id="2147483745" r:id="rId1"/>
-    <p:sldLayoutId id="2147483746" r:id="rId2"/>
-    <p:sldLayoutId id="2147483747" r:id="rId3"/>
-    <p:sldLayoutId id="2147483748" r:id="rId4"/>
-    <p:sldLayoutId id="2147483749" r:id="rId5"/>
-    <p:sldLayoutId id="2147483750" r:id="rId6"/>
-    <p:sldLayoutId id="2147483751" r:id="rId7"/>
-    <p:sldLayoutId id="2147483752" r:id="rId8"/>
-    <p:sldLayoutId id="2147483753" r:id="rId9"/>
-    <p:sldLayoutId id="2147483754" r:id="rId10"/>
-    <p:sldLayoutId id="2147483755" r:id="rId11"/>
+    <p:sldLayoutId id="2147483757" r:id="rId1"/>
+    <p:sldLayoutId id="2147483758" r:id="rId2"/>
+    <p:sldLayoutId id="2147483759" r:id="rId3"/>
+    <p:sldLayoutId id="2147483760" r:id="rId4"/>
+    <p:sldLayoutId id="2147483761" r:id="rId5"/>
+    <p:sldLayoutId id="2147483762" r:id="rId6"/>
+    <p:sldLayoutId id="2147483763" r:id="rId7"/>
+    <p:sldLayoutId id="2147483764" r:id="rId8"/>
+    <p:sldLayoutId id="2147483765" r:id="rId9"/>
+    <p:sldLayoutId id="2147483766" r:id="rId10"/>
+    <p:sldLayoutId id="2147483767" r:id="rId11"/>
   </p:sldLayoutIdLst>
   <p:txStyles>
     <p:titleStyle>
@@ -6296,7 +6306,7 @@
           <p:nvPr/>
         </p:nvPicPr>
         <p:blipFill>
-          <a:blip r:embed="rId3" cstate="print">
+          <a:blip r:embed="rId4" cstate="print">
             <a:duotone>
               <a:schemeClr val="bg2">
                 <a:shade val="45000"/>
@@ -6678,23 +6688,8 @@
                 </a:solidFill>
                 <a:latin typeface="Arial Black" pitchFamily="34" charset="0"/>
               </a:rPr>
-              <a:t>AAPT </a:t>
-            </a:r>
-            <a:r>
-              <a:rPr lang="en-US" sz="2800" dirty="0" smtClean="0">
-                <a:solidFill>
-                  <a:schemeClr val="bg1"/>
-                </a:solidFill>
-                <a:latin typeface="Arial Black" pitchFamily="34" charset="0"/>
-              </a:rPr>
-              <a:t>Winter Meeting</a:t>
-            </a:r>
-            <a:endParaRPr lang="en-US" sz="2800" dirty="0" smtClean="0">
-              <a:solidFill>
-                <a:schemeClr val="bg1"/>
-              </a:solidFill>
-              <a:latin typeface="Arial Black" pitchFamily="34" charset="0"/>
-            </a:endParaRPr>
+              <a:t>AAPT Winter Meeting</a:t>
+            </a:r>
           </a:p>
           <a:p>
             <a:pPr algn="ctr" eaLnBrk="1" hangingPunct="1"/>
@@ -6707,19 +6702,13 @@
               </a:rPr>
               <a:t>Jan 8, 2018</a:t>
             </a:r>
-            <a:endParaRPr lang="en-US" sz="2800" dirty="0" smtClean="0">
-              <a:solidFill>
-                <a:schemeClr val="bg1"/>
-              </a:solidFill>
-              <a:latin typeface="Arial Black" pitchFamily="34" charset="0"/>
-            </a:endParaRPr>
           </a:p>
         </p:txBody>
       </p:sp>
     </p:spTree>
     <p:extLst>
       <p:ext uri="{BB962C8B-B14F-4D97-AF65-F5344CB8AC3E}">
-        <p14:creationId xmlns:p14="http://schemas.microsoft.com/office/powerpoint/2010/main" val="2043384068"/>
+        <p14:creationId xmlns:p14="http://schemas.microsoft.com/office/powerpoint/2010/main" val="1691855031"/>
       </p:ext>
     </p:extLst>
   </p:cSld>
@@ -6833,6 +6822,13 @@
   <p:clrMapOvr>
     <a:masterClrMapping/>
   </p:clrMapOvr>
+  <p:timing>
+    <p:tnLst>
+      <p:par>
+        <p:cTn id="1" dur="indefinite" restart="never" nodeType="tmRoot"/>
+      </p:par>
+    </p:tnLst>
+  </p:timing>
 </p:sld>
 </file>
 
@@ -6933,6 +6929,13 @@
   <p:clrMapOvr>
     <a:masterClrMapping/>
   </p:clrMapOvr>
+  <p:timing>
+    <p:tnLst>
+      <p:par>
+        <p:cTn id="1" dur="indefinite" restart="never" nodeType="tmRoot"/>
+      </p:par>
+    </p:tnLst>
+  </p:timing>
 </p:sld>
 </file>
 
@@ -7046,6 +7049,13 @@
   <p:clrMapOvr>
     <a:masterClrMapping/>
   </p:clrMapOvr>
+  <p:timing>
+    <p:tnLst>
+      <p:par>
+        <p:cTn id="1" dur="indefinite" restart="never" nodeType="tmRoot"/>
+      </p:par>
+    </p:tnLst>
+  </p:timing>
 </p:sld>
 </file>
 
@@ -7171,6 +7181,13 @@
   <p:clrMapOvr>
     <a:masterClrMapping/>
   </p:clrMapOvr>
+  <p:timing>
+    <p:tnLst>
+      <p:par>
+        <p:cTn id="1" dur="indefinite" restart="never" nodeType="tmRoot"/>
+      </p:par>
+    </p:tnLst>
+  </p:timing>
 </p:sld>
 </file>
 
@@ -7277,6 +7294,13 @@
   <p:clrMapOvr>
     <a:masterClrMapping/>
   </p:clrMapOvr>
+  <p:timing>
+    <p:tnLst>
+      <p:par>
+        <p:cTn id="1" dur="indefinite" restart="never" nodeType="tmRoot"/>
+      </p:par>
+    </p:tnLst>
+  </p:timing>
 </p:sld>
 </file>
 
@@ -7418,6 +7442,13 @@
   <p:clrMapOvr>
     <a:masterClrMapping/>
   </p:clrMapOvr>
+  <p:timing>
+    <p:tnLst>
+      <p:par>
+        <p:cTn id="1" dur="indefinite" restart="never" nodeType="tmRoot"/>
+      </p:par>
+    </p:tnLst>
+  </p:timing>
 </p:sld>
 </file>
 
@@ -7524,6 +7555,13 @@
   <p:clrMapOvr>
     <a:masterClrMapping/>
   </p:clrMapOvr>
+  <p:timing>
+    <p:tnLst>
+      <p:par>
+        <p:cTn id="1" dur="indefinite" restart="never" nodeType="tmRoot"/>
+      </p:par>
+    </p:tnLst>
+  </p:timing>
 </p:sld>
 </file>
 
@@ -7561,11 +7599,7 @@
           <a:p>
             <a:r>
               <a:rPr lang="en-US" dirty="0" smtClean="0"/>
-              <a:t>Thanks to the UW-Stout Office of Research and Sponsored Programs </a:t>
-            </a:r>
-            <a:r>
-              <a:rPr lang="en-US" dirty="0" smtClean="0"/>
-              <a:t>and to the </a:t>
+              <a:t>Thanks to the UW-Stout Office of Research and Sponsored Programs and to the </a:t>
             </a:r>
             <a:r>
               <a:rPr lang="en-US" dirty="0" err="1" smtClean="0"/>
@@ -7573,15 +7607,7 @@
             </a:r>
             <a:r>
               <a:rPr lang="en-US" dirty="0" smtClean="0"/>
-              <a:t> Teaching and Learning Center for </a:t>
-            </a:r>
-            <a:r>
-              <a:rPr lang="en-US" dirty="0" smtClean="0"/>
-              <a:t>financial </a:t>
-            </a:r>
-            <a:r>
-              <a:rPr lang="en-US" dirty="0" smtClean="0"/>
-              <a:t>support</a:t>
+              <a:t> Teaching and Learning Center for financial support</a:t>
             </a:r>
           </a:p>
           <a:p>
@@ -7601,7 +7627,6 @@
               <a:rPr lang="en-US" sz="2000" dirty="0" smtClean="0"/>
               <a:t>Slides are available at:</a:t>
             </a:r>
-            <a:endParaRPr lang="en-US" sz="2000" dirty="0" smtClean="0"/>
           </a:p>
           <a:p>
             <a:pPr marL="109728" indent="0">
@@ -7703,7 +7728,7 @@
 </file>
 
 <file path=ppt/theme/theme1.xml><?xml version="1.0" encoding="utf-8"?>
-<a:theme xmlns:a="http://schemas.openxmlformats.org/drawingml/2006/main" name="Concourse">
+<a:theme xmlns:a="http://schemas.openxmlformats.org/drawingml/2006/main" name="Talks">
   <a:themeElements>
     <a:clrScheme name="Concourse">
       <a:dk1>
@@ -7986,6 +8011,11 @@
   </a:themeElements>
   <a:objectDefaults/>
   <a:extraClrSchemeLst/>
+  <a:extLst>
+    <a:ext uri="{05A4C25C-085E-4340-85A3-A5531E510DB2}">
+      <thm15:themeFamily xmlns:thm15="http://schemas.microsoft.com/office/thememl/2012/main" name="Talks" id="{D84D2CBB-7EBF-3F4F-8E00-AB47F85FB026}" vid="{B437A5FA-53DD-F748-AF96-B6FDB23867FA}"/>
+    </a:ext>
+  </a:extLst>
 </a:theme>
 </file>
 

</xml_diff>